<commit_message>
Qn2 complete and format for questions
</commit_message>
<xml_diff>
--- a/HW3/qn1 and 2 Config graph.pptx
+++ b/HW3/qn1 and 2 Config graph.pptx
@@ -7,6 +7,7 @@
   <p:sldIdLst>
     <p:sldId id="256" r:id="rId2"/>
     <p:sldId id="257" r:id="rId3"/>
+    <p:sldId id="258" r:id="rId4"/>
   </p:sldIdLst>
   <p:sldSz cx="12192000" cy="6858000"/>
   <p:notesSz cx="6858000" cy="9144000"/>
@@ -105,6 +106,11 @@
       </a:defRPr>
     </a:lvl9pPr>
   </p:defaultTextStyle>
+  <p:extLst>
+    <p:ext uri="{EFAFB233-063F-42B5-8137-9DF3F51BA10A}">
+      <p15:sldGuideLst xmlns:p15="http://schemas.microsoft.com/office/powerpoint/2012/main"/>
+    </p:ext>
+  </p:extLst>
 </p:presentation>
 </file>
 
@@ -4085,6 +4091,615 @@
 </p:sld>
 </file>
 
+<file path=ppt/slides/slide3.xml><?xml version="1.0" encoding="utf-8"?>
+<p:sld xmlns:a="http://schemas.openxmlformats.org/drawingml/2006/main" xmlns:r="http://schemas.openxmlformats.org/officeDocument/2006/relationships" xmlns:p="http://schemas.openxmlformats.org/presentationml/2006/main">
+  <p:cSld>
+    <p:spTree>
+      <p:nvGrpSpPr>
+        <p:cNvPr id="1" name=""/>
+        <p:cNvGrpSpPr/>
+        <p:nvPr/>
+      </p:nvGrpSpPr>
+      <p:grpSpPr>
+        <a:xfrm>
+          <a:off x="0" y="0"/>
+          <a:ext cx="0" cy="0"/>
+          <a:chOff x="0" y="0"/>
+          <a:chExt cx="0" cy="0"/>
+        </a:xfrm>
+      </p:grpSpPr>
+      <p:sp>
+        <p:nvSpPr>
+          <p:cNvPr id="2" name="Oval 1">
+            <a:extLst>
+              <a:ext uri="{FF2B5EF4-FFF2-40B4-BE49-F238E27FC236}">
+                <a16:creationId xmlns:a16="http://schemas.microsoft.com/office/drawing/2014/main" id="{EB2D7B2A-D32C-45EB-96FD-EA93D102045D}"/>
+              </a:ext>
+            </a:extLst>
+          </p:cNvPr>
+          <p:cNvSpPr/>
+          <p:nvPr/>
+        </p:nvSpPr>
+        <p:spPr>
+          <a:xfrm>
+            <a:off x="2438399" y="946485"/>
+            <a:ext cx="822463" cy="851836"/>
+          </a:xfrm>
+          <a:prstGeom prst="ellipse">
+            <a:avLst/>
+          </a:prstGeom>
+        </p:spPr>
+        <p:style>
+          <a:lnRef idx="2">
+            <a:schemeClr val="dk1"/>
+          </a:lnRef>
+          <a:fillRef idx="1">
+            <a:schemeClr val="lt1"/>
+          </a:fillRef>
+          <a:effectRef idx="0">
+            <a:schemeClr val="dk1"/>
+          </a:effectRef>
+          <a:fontRef idx="minor">
+            <a:schemeClr val="dk1"/>
+          </a:fontRef>
+        </p:style>
+        <p:txBody>
+          <a:bodyPr rtlCol="0" anchor="ctr"/>
+          <a:lstStyle/>
+          <a:p>
+            <a:pPr algn="ctr"/>
+            <a:r>
+              <a:rPr lang="en-SG" dirty="0"/>
+              <a:t>S1 (10)</a:t>
+            </a:r>
+          </a:p>
+        </p:txBody>
+      </p:sp>
+      <p:sp>
+        <p:nvSpPr>
+          <p:cNvPr id="3" name="Oval 2">
+            <a:extLst>
+              <a:ext uri="{FF2B5EF4-FFF2-40B4-BE49-F238E27FC236}">
+                <a16:creationId xmlns:a16="http://schemas.microsoft.com/office/drawing/2014/main" id="{4C7E6F32-01BD-4886-A10E-F04A5CAA741D}"/>
+              </a:ext>
+            </a:extLst>
+          </p:cNvPr>
+          <p:cNvSpPr/>
+          <p:nvPr/>
+        </p:nvSpPr>
+        <p:spPr>
+          <a:xfrm>
+            <a:off x="3541775" y="2479628"/>
+            <a:ext cx="822463" cy="851836"/>
+          </a:xfrm>
+          <a:prstGeom prst="ellipse">
+            <a:avLst/>
+          </a:prstGeom>
+        </p:spPr>
+        <p:style>
+          <a:lnRef idx="2">
+            <a:schemeClr val="dk1"/>
+          </a:lnRef>
+          <a:fillRef idx="1">
+            <a:schemeClr val="lt1"/>
+          </a:fillRef>
+          <a:effectRef idx="0">
+            <a:schemeClr val="dk1"/>
+          </a:effectRef>
+          <a:fontRef idx="minor">
+            <a:schemeClr val="dk1"/>
+          </a:fontRef>
+        </p:style>
+        <p:txBody>
+          <a:bodyPr rtlCol="0" anchor="ctr"/>
+          <a:lstStyle/>
+          <a:p>
+            <a:pPr algn="ctr"/>
+            <a:r>
+              <a:rPr lang="en-SG" dirty="0"/>
+              <a:t>S2 (20)</a:t>
+            </a:r>
+          </a:p>
+        </p:txBody>
+      </p:sp>
+      <p:sp>
+        <p:nvSpPr>
+          <p:cNvPr id="4" name="Oval 3">
+            <a:extLst>
+              <a:ext uri="{FF2B5EF4-FFF2-40B4-BE49-F238E27FC236}">
+                <a16:creationId xmlns:a16="http://schemas.microsoft.com/office/drawing/2014/main" id="{E635C472-939B-440B-8243-EC91F623D027}"/>
+              </a:ext>
+            </a:extLst>
+          </p:cNvPr>
+          <p:cNvSpPr/>
+          <p:nvPr/>
+        </p:nvSpPr>
+        <p:spPr>
+          <a:xfrm>
+            <a:off x="1432559" y="2577164"/>
+            <a:ext cx="822463" cy="851836"/>
+          </a:xfrm>
+          <a:prstGeom prst="ellipse">
+            <a:avLst/>
+          </a:prstGeom>
+        </p:spPr>
+        <p:style>
+          <a:lnRef idx="2">
+            <a:schemeClr val="dk1"/>
+          </a:lnRef>
+          <a:fillRef idx="1">
+            <a:schemeClr val="lt1"/>
+          </a:fillRef>
+          <a:effectRef idx="0">
+            <a:schemeClr val="dk1"/>
+          </a:effectRef>
+          <a:fontRef idx="minor">
+            <a:schemeClr val="dk1"/>
+          </a:fontRef>
+        </p:style>
+        <p:txBody>
+          <a:bodyPr rtlCol="0" anchor="ctr"/>
+          <a:lstStyle/>
+          <a:p>
+            <a:pPr algn="ctr"/>
+            <a:r>
+              <a:rPr lang="en-SG" dirty="0"/>
+              <a:t>S3 (30)</a:t>
+            </a:r>
+          </a:p>
+        </p:txBody>
+      </p:sp>
+      <p:cxnSp>
+        <p:nvCxnSpPr>
+          <p:cNvPr id="9" name="Connector: Curved 8">
+            <a:extLst>
+              <a:ext uri="{FF2B5EF4-FFF2-40B4-BE49-F238E27FC236}">
+                <a16:creationId xmlns:a16="http://schemas.microsoft.com/office/drawing/2014/main" id="{FEDBD5FB-E23F-4D29-BDA3-675B8E2F1617}"/>
+              </a:ext>
+            </a:extLst>
+          </p:cNvPr>
+          <p:cNvCxnSpPr>
+            <a:cxnSpLocks/>
+            <a:stCxn id="2" idx="2"/>
+            <a:endCxn id="4" idx="0"/>
+          </p:cNvCxnSpPr>
+          <p:nvPr/>
+        </p:nvCxnSpPr>
+        <p:spPr>
+          <a:xfrm rot="10800000" flipV="1">
+            <a:off x="1843791" y="1372402"/>
+            <a:ext cx="594608" cy="1204761"/>
+          </a:xfrm>
+          <a:prstGeom prst="curvedConnector2">
+            <a:avLst/>
+          </a:prstGeom>
+          <a:ln w="12700">
+            <a:headEnd type="triangle" w="med" len="med"/>
+            <a:tailEnd type="none" w="med" len="med"/>
+          </a:ln>
+        </p:spPr>
+        <p:style>
+          <a:lnRef idx="1">
+            <a:schemeClr val="dk1"/>
+          </a:lnRef>
+          <a:fillRef idx="0">
+            <a:schemeClr val="dk1"/>
+          </a:fillRef>
+          <a:effectRef idx="0">
+            <a:schemeClr val="dk1"/>
+          </a:effectRef>
+          <a:fontRef idx="minor">
+            <a:schemeClr val="tx1"/>
+          </a:fontRef>
+        </p:style>
+      </p:cxnSp>
+      <p:cxnSp>
+        <p:nvCxnSpPr>
+          <p:cNvPr id="15" name="Connector: Curved 14">
+            <a:extLst>
+              <a:ext uri="{FF2B5EF4-FFF2-40B4-BE49-F238E27FC236}">
+                <a16:creationId xmlns:a16="http://schemas.microsoft.com/office/drawing/2014/main" id="{A859A690-33C4-409B-9B24-2CB1C1F0882A}"/>
+              </a:ext>
+            </a:extLst>
+          </p:cNvPr>
+          <p:cNvCxnSpPr>
+            <a:cxnSpLocks/>
+            <a:stCxn id="2" idx="6"/>
+            <a:endCxn id="3" idx="0"/>
+          </p:cNvCxnSpPr>
+          <p:nvPr/>
+        </p:nvCxnSpPr>
+        <p:spPr>
+          <a:xfrm>
+            <a:off x="3260862" y="1372403"/>
+            <a:ext cx="692145" cy="1107225"/>
+          </a:xfrm>
+          <a:prstGeom prst="curvedConnector2">
+            <a:avLst/>
+          </a:prstGeom>
+          <a:ln w="12700">
+            <a:headEnd type="triangle" w="med" len="med"/>
+            <a:tailEnd type="none" w="med" len="med"/>
+          </a:ln>
+        </p:spPr>
+        <p:style>
+          <a:lnRef idx="1">
+            <a:schemeClr val="dk1"/>
+          </a:lnRef>
+          <a:fillRef idx="0">
+            <a:schemeClr val="dk1"/>
+          </a:fillRef>
+          <a:effectRef idx="0">
+            <a:schemeClr val="dk1"/>
+          </a:effectRef>
+          <a:fontRef idx="minor">
+            <a:schemeClr val="tx1"/>
+          </a:fontRef>
+        </p:style>
+      </p:cxnSp>
+      <p:sp>
+        <p:nvSpPr>
+          <p:cNvPr id="21" name="TextBox 20">
+            <a:extLst>
+              <a:ext uri="{FF2B5EF4-FFF2-40B4-BE49-F238E27FC236}">
+                <a16:creationId xmlns:a16="http://schemas.microsoft.com/office/drawing/2014/main" id="{FBFDF935-0A8F-4130-8865-35CCC8F8419A}"/>
+              </a:ext>
+            </a:extLst>
+          </p:cNvPr>
+          <p:cNvSpPr txBox="1"/>
+          <p:nvPr/>
+        </p:nvSpPr>
+        <p:spPr>
+          <a:xfrm>
+            <a:off x="1981075" y="1046635"/>
+            <a:ext cx="530352" cy="369332"/>
+          </a:xfrm>
+          <a:prstGeom prst="rect">
+            <a:avLst/>
+          </a:prstGeom>
+          <a:noFill/>
+        </p:spPr>
+        <p:txBody>
+          <a:bodyPr wrap="square" rtlCol="0">
+            <a:spAutoFit/>
+          </a:bodyPr>
+          <a:lstStyle/>
+          <a:p>
+            <a:r>
+              <a:rPr lang="en-SG" dirty="0"/>
+              <a:t>1/2</a:t>
+            </a:r>
+          </a:p>
+        </p:txBody>
+      </p:sp>
+      <p:sp>
+        <p:nvSpPr>
+          <p:cNvPr id="22" name="TextBox 21">
+            <a:extLst>
+              <a:ext uri="{FF2B5EF4-FFF2-40B4-BE49-F238E27FC236}">
+                <a16:creationId xmlns:a16="http://schemas.microsoft.com/office/drawing/2014/main" id="{ACD205C2-DB04-484D-A06D-186C43240F77}"/>
+              </a:ext>
+            </a:extLst>
+          </p:cNvPr>
+          <p:cNvSpPr txBox="1"/>
+          <p:nvPr/>
+        </p:nvSpPr>
+        <p:spPr>
+          <a:xfrm>
+            <a:off x="716280" y="624840"/>
+            <a:ext cx="822463" cy="646331"/>
+          </a:xfrm>
+          <a:prstGeom prst="rect">
+            <a:avLst/>
+          </a:prstGeom>
+          <a:noFill/>
+        </p:spPr>
+        <p:txBody>
+          <a:bodyPr wrap="square" rtlCol="0">
+            <a:spAutoFit/>
+          </a:bodyPr>
+          <a:lstStyle/>
+          <a:p>
+            <a:r>
+              <a:rPr lang="en-SG" dirty="0"/>
+              <a:t>Q2a</a:t>
+            </a:r>
+          </a:p>
+          <a:p>
+            <a:endParaRPr lang="en-SG" dirty="0"/>
+          </a:p>
+        </p:txBody>
+      </p:sp>
+      <p:cxnSp>
+        <p:nvCxnSpPr>
+          <p:cNvPr id="23" name="Connector: Curved 22">
+            <a:extLst>
+              <a:ext uri="{FF2B5EF4-FFF2-40B4-BE49-F238E27FC236}">
+                <a16:creationId xmlns:a16="http://schemas.microsoft.com/office/drawing/2014/main" id="{D257DB8B-BCC2-4BA3-A0A8-023C4077D065}"/>
+              </a:ext>
+            </a:extLst>
+          </p:cNvPr>
+          <p:cNvCxnSpPr>
+            <a:cxnSpLocks/>
+            <a:stCxn id="2" idx="0"/>
+          </p:cNvCxnSpPr>
+          <p:nvPr/>
+        </p:nvCxnSpPr>
+        <p:spPr>
+          <a:xfrm rot="16200000" flipH="1">
+            <a:off x="2927757" y="868358"/>
+            <a:ext cx="100151" cy="256404"/>
+          </a:xfrm>
+          <a:prstGeom prst="curvedConnector4">
+            <a:avLst>
+              <a:gd name="adj1" fmla="val -343907"/>
+              <a:gd name="adj2" fmla="val 237847"/>
+            </a:avLst>
+          </a:prstGeom>
+          <a:ln w="12700">
+            <a:headEnd type="triangle" w="med" len="med"/>
+            <a:tailEnd type="none" w="med" len="med"/>
+          </a:ln>
+        </p:spPr>
+        <p:style>
+          <a:lnRef idx="1">
+            <a:schemeClr val="dk1"/>
+          </a:lnRef>
+          <a:fillRef idx="0">
+            <a:schemeClr val="dk1"/>
+          </a:fillRef>
+          <a:effectRef idx="0">
+            <a:schemeClr val="dk1"/>
+          </a:effectRef>
+          <a:fontRef idx="minor">
+            <a:schemeClr val="tx1"/>
+          </a:fontRef>
+        </p:style>
+      </p:cxnSp>
+      <p:sp>
+        <p:nvSpPr>
+          <p:cNvPr id="38" name="TextBox 37">
+            <a:extLst>
+              <a:ext uri="{FF2B5EF4-FFF2-40B4-BE49-F238E27FC236}">
+                <a16:creationId xmlns:a16="http://schemas.microsoft.com/office/drawing/2014/main" id="{B89315C0-4178-456C-8DDD-DC54BBDCD520}"/>
+              </a:ext>
+            </a:extLst>
+          </p:cNvPr>
+          <p:cNvSpPr txBox="1"/>
+          <p:nvPr/>
+        </p:nvSpPr>
+        <p:spPr>
+          <a:xfrm>
+            <a:off x="3223911" y="1086505"/>
+            <a:ext cx="530352" cy="369332"/>
+          </a:xfrm>
+          <a:prstGeom prst="rect">
+            <a:avLst/>
+          </a:prstGeom>
+          <a:noFill/>
+        </p:spPr>
+        <p:txBody>
+          <a:bodyPr wrap="square" rtlCol="0">
+            <a:spAutoFit/>
+          </a:bodyPr>
+          <a:lstStyle/>
+          <a:p>
+            <a:r>
+              <a:rPr lang="en-SG" dirty="0"/>
+              <a:t>1/2</a:t>
+            </a:r>
+          </a:p>
+        </p:txBody>
+      </p:sp>
+      <p:cxnSp>
+        <p:nvCxnSpPr>
+          <p:cNvPr id="60" name="Connector: Curved 59">
+            <a:extLst>
+              <a:ext uri="{FF2B5EF4-FFF2-40B4-BE49-F238E27FC236}">
+                <a16:creationId xmlns:a16="http://schemas.microsoft.com/office/drawing/2014/main" id="{AD2116C6-233D-4620-8E2C-82F5F95620F5}"/>
+              </a:ext>
+            </a:extLst>
+          </p:cNvPr>
+          <p:cNvCxnSpPr>
+            <a:cxnSpLocks/>
+            <a:stCxn id="3" idx="4"/>
+          </p:cNvCxnSpPr>
+          <p:nvPr/>
+        </p:nvCxnSpPr>
+        <p:spPr>
+          <a:xfrm rot="5400000" flipH="1" flipV="1">
+            <a:off x="3982262" y="2949489"/>
+            <a:ext cx="352720" cy="411230"/>
+          </a:xfrm>
+          <a:prstGeom prst="curvedConnector4">
+            <a:avLst>
+              <a:gd name="adj1" fmla="val -52713"/>
+              <a:gd name="adj2" fmla="val 177946"/>
+            </a:avLst>
+          </a:prstGeom>
+          <a:ln w="12700">
+            <a:headEnd type="triangle" w="med" len="med"/>
+            <a:tailEnd type="none" w="med" len="med"/>
+          </a:ln>
+        </p:spPr>
+        <p:style>
+          <a:lnRef idx="1">
+            <a:schemeClr val="dk1"/>
+          </a:lnRef>
+          <a:fillRef idx="0">
+            <a:schemeClr val="dk1"/>
+          </a:fillRef>
+          <a:effectRef idx="0">
+            <a:schemeClr val="dk1"/>
+          </a:effectRef>
+          <a:fontRef idx="minor">
+            <a:schemeClr val="tx1"/>
+          </a:fontRef>
+        </p:style>
+      </p:cxnSp>
+      <p:cxnSp>
+        <p:nvCxnSpPr>
+          <p:cNvPr id="67" name="Connector: Curved 66">
+            <a:extLst>
+              <a:ext uri="{FF2B5EF4-FFF2-40B4-BE49-F238E27FC236}">
+                <a16:creationId xmlns:a16="http://schemas.microsoft.com/office/drawing/2014/main" id="{827C2E8E-E1B0-4C41-A11D-262CB7A3091F}"/>
+              </a:ext>
+            </a:extLst>
+          </p:cNvPr>
+          <p:cNvCxnSpPr>
+            <a:cxnSpLocks/>
+          </p:cNvCxnSpPr>
+          <p:nvPr/>
+        </p:nvCxnSpPr>
+        <p:spPr>
+          <a:xfrm rot="5400000" flipH="1" flipV="1">
+            <a:off x="1873045" y="3047025"/>
+            <a:ext cx="352720" cy="411230"/>
+          </a:xfrm>
+          <a:prstGeom prst="curvedConnector4">
+            <a:avLst>
+              <a:gd name="adj1" fmla="val -52713"/>
+              <a:gd name="adj2" fmla="val 177946"/>
+            </a:avLst>
+          </a:prstGeom>
+          <a:ln w="12700">
+            <a:headEnd type="triangle" w="med" len="med"/>
+            <a:tailEnd type="none" w="med" len="med"/>
+          </a:ln>
+        </p:spPr>
+        <p:style>
+          <a:lnRef idx="1">
+            <a:schemeClr val="dk1"/>
+          </a:lnRef>
+          <a:fillRef idx="0">
+            <a:schemeClr val="dk1"/>
+          </a:fillRef>
+          <a:effectRef idx="0">
+            <a:schemeClr val="dk1"/>
+          </a:effectRef>
+          <a:fontRef idx="minor">
+            <a:schemeClr val="tx1"/>
+          </a:fontRef>
+        </p:style>
+      </p:cxnSp>
+      <p:sp>
+        <p:nvSpPr>
+          <p:cNvPr id="72" name="TextBox 71">
+            <a:extLst>
+              <a:ext uri="{FF2B5EF4-FFF2-40B4-BE49-F238E27FC236}">
+                <a16:creationId xmlns:a16="http://schemas.microsoft.com/office/drawing/2014/main" id="{25842425-DC09-44A4-BF19-484673259F9F}"/>
+              </a:ext>
+            </a:extLst>
+          </p:cNvPr>
+          <p:cNvSpPr txBox="1"/>
+          <p:nvPr/>
+        </p:nvSpPr>
+        <p:spPr>
+          <a:xfrm>
+            <a:off x="2575683" y="492639"/>
+            <a:ext cx="530352" cy="369332"/>
+          </a:xfrm>
+          <a:prstGeom prst="rect">
+            <a:avLst/>
+          </a:prstGeom>
+          <a:noFill/>
+        </p:spPr>
+        <p:txBody>
+          <a:bodyPr wrap="square" rtlCol="0">
+            <a:spAutoFit/>
+          </a:bodyPr>
+          <a:lstStyle/>
+          <a:p>
+            <a:r>
+              <a:rPr lang="en-SG" dirty="0"/>
+              <a:t>1</a:t>
+            </a:r>
+          </a:p>
+        </p:txBody>
+      </p:sp>
+      <p:sp>
+        <p:nvSpPr>
+          <p:cNvPr id="73" name="TextBox 72">
+            <a:extLst>
+              <a:ext uri="{FF2B5EF4-FFF2-40B4-BE49-F238E27FC236}">
+                <a16:creationId xmlns:a16="http://schemas.microsoft.com/office/drawing/2014/main" id="{F1C20AFF-3C92-45D8-B4D6-C8C74FCB3836}"/>
+              </a:ext>
+            </a:extLst>
+          </p:cNvPr>
+          <p:cNvSpPr txBox="1"/>
+          <p:nvPr/>
+        </p:nvSpPr>
+        <p:spPr>
+          <a:xfrm>
+            <a:off x="1432559" y="3503419"/>
+            <a:ext cx="530352" cy="369332"/>
+          </a:xfrm>
+          <a:prstGeom prst="rect">
+            <a:avLst/>
+          </a:prstGeom>
+          <a:noFill/>
+        </p:spPr>
+        <p:txBody>
+          <a:bodyPr wrap="square" rtlCol="0">
+            <a:spAutoFit/>
+          </a:bodyPr>
+          <a:lstStyle/>
+          <a:p>
+            <a:r>
+              <a:rPr lang="en-SG" dirty="0"/>
+              <a:t>1/2</a:t>
+            </a:r>
+          </a:p>
+        </p:txBody>
+      </p:sp>
+      <p:sp>
+        <p:nvSpPr>
+          <p:cNvPr id="74" name="TextBox 73">
+            <a:extLst>
+              <a:ext uri="{FF2B5EF4-FFF2-40B4-BE49-F238E27FC236}">
+                <a16:creationId xmlns:a16="http://schemas.microsoft.com/office/drawing/2014/main" id="{2DE1F3F8-DA94-438A-B04C-AE4A95B91E9C}"/>
+              </a:ext>
+            </a:extLst>
+          </p:cNvPr>
+          <p:cNvSpPr txBox="1"/>
+          <p:nvPr/>
+        </p:nvSpPr>
+        <p:spPr>
+          <a:xfrm>
+            <a:off x="3687830" y="3402187"/>
+            <a:ext cx="530352" cy="369332"/>
+          </a:xfrm>
+          <a:prstGeom prst="rect">
+            <a:avLst/>
+          </a:prstGeom>
+          <a:noFill/>
+        </p:spPr>
+        <p:txBody>
+          <a:bodyPr wrap="square" rtlCol="0">
+            <a:spAutoFit/>
+          </a:bodyPr>
+          <a:lstStyle/>
+          <a:p>
+            <a:r>
+              <a:rPr lang="en-SG" dirty="0"/>
+              <a:t>1/2</a:t>
+            </a:r>
+          </a:p>
+        </p:txBody>
+      </p:sp>
+    </p:spTree>
+    <p:extLst>
+      <p:ext uri="{BB962C8B-B14F-4D97-AF65-F5344CB8AC3E}">
+        <p14:creationId xmlns:p14="http://schemas.microsoft.com/office/powerpoint/2010/main" val="1859989902"/>
+      </p:ext>
+    </p:extLst>
+  </p:cSld>
+  <p:clrMapOvr>
+    <a:masterClrMapping/>
+  </p:clrMapOvr>
+</p:sld>
+</file>
+
 <file path=ppt/theme/theme1.xml><?xml version="1.0" encoding="utf-8"?>
 <a:theme xmlns:a="http://schemas.openxmlformats.org/drawingml/2006/main" name="Office Theme">
   <a:themeElements>

</xml_diff>

<commit_message>
HW3 Submission Latex to PDF to preserve image
</commit_message>
<xml_diff>
--- a/HW3/qn1 and 2 Config graph.pptx
+++ b/HW3/qn1 and 2 Config graph.pptx
@@ -263,7 +263,7 @@
           <a:p>
             <a:fld id="{29ECDEAB-BD8C-489E-BD30-580442BDC038}" type="datetimeFigureOut">
               <a:rPr lang="en-SG" smtClean="0"/>
-              <a:t>8/2/2018</a:t>
+              <a:t>13/2/2018</a:t>
             </a:fld>
             <a:endParaRPr lang="en-SG"/>
           </a:p>
@@ -463,7 +463,7 @@
           <a:p>
             <a:fld id="{29ECDEAB-BD8C-489E-BD30-580442BDC038}" type="datetimeFigureOut">
               <a:rPr lang="en-SG" smtClean="0"/>
-              <a:t>8/2/2018</a:t>
+              <a:t>13/2/2018</a:t>
             </a:fld>
             <a:endParaRPr lang="en-SG"/>
           </a:p>
@@ -673,7 +673,7 @@
           <a:p>
             <a:fld id="{29ECDEAB-BD8C-489E-BD30-580442BDC038}" type="datetimeFigureOut">
               <a:rPr lang="en-SG" smtClean="0"/>
-              <a:t>8/2/2018</a:t>
+              <a:t>13/2/2018</a:t>
             </a:fld>
             <a:endParaRPr lang="en-SG"/>
           </a:p>
@@ -873,7 +873,7 @@
           <a:p>
             <a:fld id="{29ECDEAB-BD8C-489E-BD30-580442BDC038}" type="datetimeFigureOut">
               <a:rPr lang="en-SG" smtClean="0"/>
-              <a:t>8/2/2018</a:t>
+              <a:t>13/2/2018</a:t>
             </a:fld>
             <a:endParaRPr lang="en-SG"/>
           </a:p>
@@ -1149,7 +1149,7 @@
           <a:p>
             <a:fld id="{29ECDEAB-BD8C-489E-BD30-580442BDC038}" type="datetimeFigureOut">
               <a:rPr lang="en-SG" smtClean="0"/>
-              <a:t>8/2/2018</a:t>
+              <a:t>13/2/2018</a:t>
             </a:fld>
             <a:endParaRPr lang="en-SG"/>
           </a:p>
@@ -1417,7 +1417,7 @@
           <a:p>
             <a:fld id="{29ECDEAB-BD8C-489E-BD30-580442BDC038}" type="datetimeFigureOut">
               <a:rPr lang="en-SG" smtClean="0"/>
-              <a:t>8/2/2018</a:t>
+              <a:t>13/2/2018</a:t>
             </a:fld>
             <a:endParaRPr lang="en-SG"/>
           </a:p>
@@ -1832,7 +1832,7 @@
           <a:p>
             <a:fld id="{29ECDEAB-BD8C-489E-BD30-580442BDC038}" type="datetimeFigureOut">
               <a:rPr lang="en-SG" smtClean="0"/>
-              <a:t>8/2/2018</a:t>
+              <a:t>13/2/2018</a:t>
             </a:fld>
             <a:endParaRPr lang="en-SG"/>
           </a:p>
@@ -1974,7 +1974,7 @@
           <a:p>
             <a:fld id="{29ECDEAB-BD8C-489E-BD30-580442BDC038}" type="datetimeFigureOut">
               <a:rPr lang="en-SG" smtClean="0"/>
-              <a:t>8/2/2018</a:t>
+              <a:t>13/2/2018</a:t>
             </a:fld>
             <a:endParaRPr lang="en-SG"/>
           </a:p>
@@ -2087,7 +2087,7 @@
           <a:p>
             <a:fld id="{29ECDEAB-BD8C-489E-BD30-580442BDC038}" type="datetimeFigureOut">
               <a:rPr lang="en-SG" smtClean="0"/>
-              <a:t>8/2/2018</a:t>
+              <a:t>13/2/2018</a:t>
             </a:fld>
             <a:endParaRPr lang="en-SG"/>
           </a:p>
@@ -2400,7 +2400,7 @@
           <a:p>
             <a:fld id="{29ECDEAB-BD8C-489E-BD30-580442BDC038}" type="datetimeFigureOut">
               <a:rPr lang="en-SG" smtClean="0"/>
-              <a:t>8/2/2018</a:t>
+              <a:t>13/2/2018</a:t>
             </a:fld>
             <a:endParaRPr lang="en-SG"/>
           </a:p>
@@ -2689,7 +2689,7 @@
           <a:p>
             <a:fld id="{29ECDEAB-BD8C-489E-BD30-580442BDC038}" type="datetimeFigureOut">
               <a:rPr lang="en-SG" smtClean="0"/>
-              <a:t>8/2/2018</a:t>
+              <a:t>13/2/2018</a:t>
             </a:fld>
             <a:endParaRPr lang="en-SG"/>
           </a:p>
@@ -2932,7 +2932,7 @@
           <a:p>
             <a:fld id="{29ECDEAB-BD8C-489E-BD30-580442BDC038}" type="datetimeFigureOut">
               <a:rPr lang="en-SG" smtClean="0"/>
-              <a:t>8/2/2018</a:t>
+              <a:t>13/2/2018</a:t>
             </a:fld>
             <a:endParaRPr lang="en-SG"/>
           </a:p>
@@ -3443,7 +3443,7 @@
         </p:nvSpPr>
         <p:spPr>
           <a:xfrm>
-            <a:off x="2438399" y="946485"/>
+            <a:off x="4670322" y="1349608"/>
             <a:ext cx="822463" cy="851836"/>
           </a:xfrm>
           <a:prstGeom prst="ellipse">
@@ -3490,7 +3490,7 @@
         </p:nvSpPr>
         <p:spPr>
           <a:xfrm>
-            <a:off x="3541775" y="2479628"/>
+            <a:off x="5773698" y="2882751"/>
             <a:ext cx="822463" cy="851836"/>
           </a:xfrm>
           <a:prstGeom prst="ellipse">
@@ -3537,7 +3537,7 @@
         </p:nvSpPr>
         <p:spPr>
           <a:xfrm>
-            <a:off x="1432559" y="2577164"/>
+            <a:off x="3664482" y="2980287"/>
             <a:ext cx="822463" cy="851836"/>
           </a:xfrm>
           <a:prstGeom prst="ellipse">
@@ -3584,7 +3584,7 @@
         </p:nvSpPr>
         <p:spPr>
           <a:xfrm>
-            <a:off x="1281964" y="2294962"/>
+            <a:off x="3513887" y="2698085"/>
             <a:ext cx="530352" cy="369332"/>
           </a:xfrm>
           <a:prstGeom prst="rect">
@@ -3623,7 +3623,7 @@
         </p:nvCxnSpPr>
         <p:spPr>
           <a:xfrm rot="10800000" flipV="1">
-            <a:off x="1843791" y="1372402"/>
+            <a:off x="4075714" y="1775525"/>
             <a:ext cx="594608" cy="1204761"/>
           </a:xfrm>
           <a:prstGeom prst="curvedConnector2">
@@ -3667,7 +3667,7 @@
         </p:nvCxnSpPr>
         <p:spPr>
           <a:xfrm>
-            <a:off x="3260862" y="1372403"/>
+            <a:off x="5492785" y="1775526"/>
             <a:ext cx="692145" cy="1107225"/>
           </a:xfrm>
           <a:prstGeom prst="curvedConnector2">
@@ -3707,7 +3707,7 @@
         </p:nvSpPr>
         <p:spPr>
           <a:xfrm>
-            <a:off x="3968744" y="2151524"/>
+            <a:off x="6200667" y="2554647"/>
             <a:ext cx="530352" cy="369332"/>
           </a:xfrm>
           <a:prstGeom prst="rect">
@@ -3742,7 +3742,7 @@
         </p:nvSpPr>
         <p:spPr>
           <a:xfrm>
-            <a:off x="1981075" y="1046635"/>
+            <a:off x="4212998" y="1449758"/>
             <a:ext cx="530352" cy="369332"/>
           </a:xfrm>
           <a:prstGeom prst="rect">
@@ -3818,7 +3818,7 @@
         </p:nvCxnSpPr>
         <p:spPr>
           <a:xfrm rot="16200000" flipH="1">
-            <a:off x="2927757" y="868358"/>
+            <a:off x="5159680" y="1271481"/>
             <a:ext cx="100151" cy="256404"/>
           </a:xfrm>
           <a:prstGeom prst="curvedConnector4">
@@ -3861,7 +3861,7 @@
         </p:nvSpPr>
         <p:spPr>
           <a:xfrm>
-            <a:off x="3223911" y="1086505"/>
+            <a:off x="5455834" y="1489628"/>
             <a:ext cx="530352" cy="369332"/>
           </a:xfrm>
           <a:prstGeom prst="rect">
@@ -3899,7 +3899,7 @@
         </p:nvCxnSpPr>
         <p:spPr>
           <a:xfrm rot="5400000" flipH="1" flipV="1">
-            <a:off x="3982262" y="2949489"/>
+            <a:off x="6214185" y="3352612"/>
             <a:ext cx="352720" cy="411230"/>
           </a:xfrm>
           <a:prstGeom prst="curvedConnector4">
@@ -3944,7 +3944,7 @@
         </p:nvCxnSpPr>
         <p:spPr>
           <a:xfrm rot="5400000" flipH="1" flipV="1">
-            <a:off x="1873045" y="3047025"/>
+            <a:off x="4104968" y="3450148"/>
             <a:ext cx="352720" cy="411230"/>
           </a:xfrm>
           <a:prstGeom prst="curvedConnector4">
@@ -3987,7 +3987,7 @@
         </p:nvSpPr>
         <p:spPr>
           <a:xfrm>
-            <a:off x="2447480" y="527077"/>
+            <a:off x="4679403" y="930200"/>
             <a:ext cx="530352" cy="369332"/>
           </a:xfrm>
           <a:prstGeom prst="rect">
@@ -4022,7 +4022,7 @@
         </p:nvSpPr>
         <p:spPr>
           <a:xfrm>
-            <a:off x="1432559" y="3503419"/>
+            <a:off x="3664482" y="3906542"/>
             <a:ext cx="530352" cy="369332"/>
           </a:xfrm>
           <a:prstGeom prst="rect">
@@ -4057,7 +4057,7 @@
         </p:nvSpPr>
         <p:spPr>
           <a:xfrm>
-            <a:off x="3687830" y="3402187"/>
+            <a:off x="5919753" y="3805310"/>
             <a:ext cx="530352" cy="369332"/>
           </a:xfrm>
           <a:prstGeom prst="rect">
@@ -4122,7 +4122,7 @@
         </p:nvSpPr>
         <p:spPr>
           <a:xfrm>
-            <a:off x="2438399" y="946485"/>
+            <a:off x="4838699" y="1271171"/>
             <a:ext cx="822463" cy="851836"/>
           </a:xfrm>
           <a:prstGeom prst="ellipse">
@@ -4169,7 +4169,7 @@
         </p:nvSpPr>
         <p:spPr>
           <a:xfrm>
-            <a:off x="3541775" y="2479628"/>
+            <a:off x="5942075" y="2804314"/>
             <a:ext cx="822463" cy="851836"/>
           </a:xfrm>
           <a:prstGeom prst="ellipse">
@@ -4216,7 +4216,7 @@
         </p:nvSpPr>
         <p:spPr>
           <a:xfrm>
-            <a:off x="1432559" y="2577164"/>
+            <a:off x="3832859" y="2901850"/>
             <a:ext cx="822463" cy="851836"/>
           </a:xfrm>
           <a:prstGeom prst="ellipse">
@@ -4267,7 +4267,7 @@
         </p:nvCxnSpPr>
         <p:spPr>
           <a:xfrm rot="10800000" flipV="1">
-            <a:off x="1843791" y="1372402"/>
+            <a:off x="4244091" y="1697088"/>
             <a:ext cx="594608" cy="1204761"/>
           </a:xfrm>
           <a:prstGeom prst="curvedConnector2">
@@ -4311,7 +4311,7 @@
         </p:nvCxnSpPr>
         <p:spPr>
           <a:xfrm>
-            <a:off x="3260862" y="1372403"/>
+            <a:off x="5661162" y="1697089"/>
             <a:ext cx="692145" cy="1107225"/>
           </a:xfrm>
           <a:prstGeom prst="curvedConnector2">
@@ -4351,7 +4351,7 @@
         </p:nvSpPr>
         <p:spPr>
           <a:xfrm>
-            <a:off x="1981075" y="1046635"/>
+            <a:off x="4381375" y="1371321"/>
             <a:ext cx="530352" cy="369332"/>
           </a:xfrm>
           <a:prstGeom prst="rect">
@@ -4427,7 +4427,7 @@
         </p:nvCxnSpPr>
         <p:spPr>
           <a:xfrm rot="16200000" flipH="1">
-            <a:off x="2927757" y="868358"/>
+            <a:off x="5328057" y="1193044"/>
             <a:ext cx="100151" cy="256404"/>
           </a:xfrm>
           <a:prstGeom prst="curvedConnector4">
@@ -4470,7 +4470,7 @@
         </p:nvSpPr>
         <p:spPr>
           <a:xfrm>
-            <a:off x="3223911" y="1086505"/>
+            <a:off x="5624211" y="1411191"/>
             <a:ext cx="530352" cy="369332"/>
           </a:xfrm>
           <a:prstGeom prst="rect">
@@ -4508,7 +4508,7 @@
         </p:nvCxnSpPr>
         <p:spPr>
           <a:xfrm rot="5400000" flipH="1" flipV="1">
-            <a:off x="3982262" y="2949489"/>
+            <a:off x="6382562" y="3274175"/>
             <a:ext cx="352720" cy="411230"/>
           </a:xfrm>
           <a:prstGeom prst="curvedConnector4">
@@ -4553,7 +4553,7 @@
         </p:nvCxnSpPr>
         <p:spPr>
           <a:xfrm rot="5400000" flipH="1" flipV="1">
-            <a:off x="1873045" y="3047025"/>
+            <a:off x="4273345" y="3371711"/>
             <a:ext cx="352720" cy="411230"/>
           </a:xfrm>
           <a:prstGeom prst="curvedConnector4">
@@ -4596,7 +4596,7 @@
         </p:nvSpPr>
         <p:spPr>
           <a:xfrm>
-            <a:off x="2575683" y="492639"/>
+            <a:off x="4975983" y="817325"/>
             <a:ext cx="530352" cy="369332"/>
           </a:xfrm>
           <a:prstGeom prst="rect">
@@ -4631,7 +4631,7 @@
         </p:nvSpPr>
         <p:spPr>
           <a:xfrm>
-            <a:off x="1432559" y="3503419"/>
+            <a:off x="3832859" y="3828105"/>
             <a:ext cx="530352" cy="369332"/>
           </a:xfrm>
           <a:prstGeom prst="rect">
@@ -4666,7 +4666,7 @@
         </p:nvSpPr>
         <p:spPr>
           <a:xfrm>
-            <a:off x="3687830" y="3402187"/>
+            <a:off x="6088130" y="3726873"/>
             <a:ext cx="530352" cy="369332"/>
           </a:xfrm>
           <a:prstGeom prst="rect">

</xml_diff>